<commit_message>
menambahkan fitur minimum date pada PPT
</commit_message>
<xml_diff>
--- a/Dream Reacher App Presentation.pptx
+++ b/Dream Reacher App Presentation.pptx
@@ -5740,7 +5740,7 @@
         </p:nvSpPr>
         <p:spPr>
           <a:xfrm>
-            <a:off x="1571975" y="1582178"/>
+            <a:off x="665526" y="1582178"/>
             <a:ext cx="2582647" cy="732600"/>
           </a:xfrm>
           <a:prstGeom prst="rect">
@@ -5799,7 +5799,7 @@
         </p:nvSpPr>
         <p:spPr>
           <a:xfrm>
-            <a:off x="1165574" y="1197180"/>
+            <a:off x="259125" y="1197180"/>
             <a:ext cx="3395447" cy="296836"/>
           </a:xfrm>
           <a:prstGeom prst="rect">
@@ -5857,7 +5857,7 @@
         </p:nvSpPr>
         <p:spPr>
           <a:xfrm>
-            <a:off x="1556179" y="3379923"/>
+            <a:off x="649730" y="3379923"/>
             <a:ext cx="2794810" cy="1175933"/>
           </a:xfrm>
           <a:prstGeom prst="rect">
@@ -6163,7 +6163,7 @@
         </p:nvSpPr>
         <p:spPr>
           <a:xfrm>
-            <a:off x="267654" y="2992598"/>
+            <a:off x="-638795" y="2992598"/>
             <a:ext cx="4689638" cy="482400"/>
           </a:xfrm>
           <a:prstGeom prst="rect">
@@ -6221,7 +6221,7 @@
         </p:nvSpPr>
         <p:spPr>
           <a:xfrm>
-            <a:off x="1571975" y="2491102"/>
+            <a:off x="665526" y="2491102"/>
             <a:ext cx="2661618" cy="732600"/>
           </a:xfrm>
           <a:prstGeom prst="rect">
@@ -6284,7 +6284,7 @@
         </p:nvSpPr>
         <p:spPr>
           <a:xfrm>
-            <a:off x="892860" y="2106354"/>
+            <a:off x="-13589" y="2106354"/>
             <a:ext cx="3807683" cy="622796"/>
           </a:xfrm>
           <a:prstGeom prst="rect">
@@ -6461,7 +6461,7 @@
         </p:nvSpPr>
         <p:spPr>
           <a:xfrm>
-            <a:off x="3534780" y="2002738"/>
+            <a:off x="2063787" y="2002738"/>
             <a:ext cx="5481515" cy="364200"/>
           </a:xfrm>
           <a:prstGeom prst="rect">
@@ -6771,8 +6771,8 @@
         </p:nvSpPr>
         <p:spPr>
           <a:xfrm>
-            <a:off x="5636407" y="2366938"/>
-            <a:ext cx="2256102" cy="923569"/>
+            <a:off x="4165413" y="2366938"/>
+            <a:ext cx="4778150" cy="923569"/>
           </a:xfrm>
           <a:prstGeom prst="rect">
             <a:avLst/>
@@ -7076,6 +7076,77 @@
               </a:rPr>
               <a:t> CSS</a:t>
             </a:r>
+          </a:p>
+          <a:p>
+            <a:pPr marL="171450" indent="-171450" algn="just">
+              <a:buClr>
+                <a:schemeClr val="dk1"/>
+              </a:buClr>
+              <a:buSzPts val="1100"/>
+              <a:buFont typeface="Wingdings" panose="05000000000000000000" pitchFamily="2" charset="2"/>
+              <a:buChar char="q"/>
+            </a:pPr>
+            <a:r>
+              <a:rPr lang="en-ID" dirty="0" err="1">
+                <a:solidFill>
+                  <a:schemeClr val="tx1"/>
+                </a:solidFill>
+              </a:rPr>
+              <a:t>Terdapat</a:t>
+            </a:r>
+            <a:r>
+              <a:rPr lang="en-ID" dirty="0">
+                <a:solidFill>
+                  <a:schemeClr val="tx1"/>
+                </a:solidFill>
+              </a:rPr>
+              <a:t> </a:t>
+            </a:r>
+            <a:r>
+              <a:rPr lang="en-ID" dirty="0" err="1">
+                <a:solidFill>
+                  <a:schemeClr val="tx1"/>
+                </a:solidFill>
+              </a:rPr>
+              <a:t>pengaman</a:t>
+            </a:r>
+            <a:r>
+              <a:rPr lang="en-ID" dirty="0">
+                <a:solidFill>
+                  <a:schemeClr val="tx1"/>
+                </a:solidFill>
+              </a:rPr>
+              <a:t> minimal </a:t>
+            </a:r>
+            <a:r>
+              <a:rPr lang="en-ID" dirty="0" err="1">
+                <a:solidFill>
+                  <a:schemeClr val="tx1"/>
+                </a:solidFill>
+              </a:rPr>
+              <a:t>masukan</a:t>
+            </a:r>
+            <a:r>
+              <a:rPr lang="en-ID" dirty="0">
+                <a:solidFill>
+                  <a:schemeClr val="tx1"/>
+                </a:solidFill>
+              </a:rPr>
+              <a:t> </a:t>
+            </a:r>
+            <a:r>
+              <a:rPr lang="en-ID" dirty="0" err="1">
+                <a:solidFill>
+                  <a:schemeClr val="tx1"/>
+                </a:solidFill>
+              </a:rPr>
+              <a:t>tanggal</a:t>
+            </a:r>
+            <a:endParaRPr lang="en-ID" dirty="0">
+              <a:solidFill>
+                <a:schemeClr val="tx1"/>
+              </a:solidFill>
+            </a:endParaRPr>
           </a:p>
           <a:p>
             <a:pPr marL="171450" indent="-171450" algn="just">
@@ -7147,8 +7218,8 @@
         </p:nvSpPr>
         <p:spPr>
           <a:xfrm>
-            <a:off x="1197600" y="1200149"/>
-            <a:ext cx="4575047" cy="3391651"/>
+            <a:off x="1205552" y="735451"/>
+            <a:ext cx="4575047" cy="4249950"/>
           </a:xfrm>
           <a:prstGeom prst="rect">
             <a:avLst/>
@@ -7466,7 +7537,7 @@
                   <a:schemeClr val="tx1"/>
                 </a:solidFill>
               </a:rPr>
-              <a:t>Dapat</a:t>
+              <a:t>Terdapat</a:t>
             </a:r>
             <a:r>
               <a:rPr lang="en-US" i="1" dirty="0">
@@ -7482,7 +7553,7 @@
                   <a:schemeClr val="tx1"/>
                 </a:solidFill>
               </a:rPr>
-              <a:t>menambah</a:t>
+              <a:t>pengaman</a:t>
             </a:r>
             <a:r>
               <a:rPr lang="en-US" i="1" dirty="0">
@@ -7490,61 +7561,184 @@
                   <a:schemeClr val="tx1"/>
                 </a:solidFill>
               </a:rPr>
-              <a:t>/</a:t>
-            </a:r>
-            <a:r>
-              <a:rPr lang="en-US" i="1" dirty="0" err="1">
-                <a:solidFill>
-                  <a:schemeClr val="tx1"/>
-                </a:solidFill>
-              </a:rPr>
-              <a:t>membaca</a:t>
-            </a:r>
-            <a:r>
-              <a:rPr lang="en-US" i="1" dirty="0">
-                <a:solidFill>
-                  <a:schemeClr val="tx1"/>
-                </a:solidFill>
-              </a:rPr>
-              <a:t>/</a:t>
-            </a:r>
-            <a:r>
-              <a:rPr lang="en-US" i="1" dirty="0" err="1">
-                <a:solidFill>
-                  <a:schemeClr val="tx1"/>
-                </a:solidFill>
-              </a:rPr>
-              <a:t>menghapus</a:t>
-            </a:r>
-            <a:r>
-              <a:rPr lang="en-US" i="1" dirty="0">
-                <a:solidFill>
-                  <a:schemeClr val="tx1"/>
-                </a:solidFill>
-              </a:rPr>
               <a:t> </a:t>
             </a:r>
             <a:r>
-              <a:rPr lang="en-US" i="1" dirty="0">
+              <a:rPr lang="en-US" b="1" i="1" dirty="0">
                 <a:solidFill>
                   <a:srgbClr val="AD3A50"/>
                 </a:solidFill>
               </a:rPr>
-              <a:t>baris </a:t>
-            </a:r>
-            <a:r>
-              <a:rPr lang="en-US" i="1" dirty="0" err="1">
+              <a:t>minimal </a:t>
+            </a:r>
+            <a:r>
+              <a:rPr lang="en-US" b="1" i="1" dirty="0" err="1">
                 <a:solidFill>
                   <a:srgbClr val="AD3A50"/>
                 </a:solidFill>
               </a:rPr>
-              <a:t>baru</a:t>
-            </a:r>
-            <a:endParaRPr lang="en-US" i="1" dirty="0">
+              <a:t>tanggal</a:t>
+            </a:r>
+            <a:endParaRPr lang="en-US" b="1" i="1" dirty="0">
               <a:solidFill>
                 <a:srgbClr val="AD3A50"/>
               </a:solidFill>
             </a:endParaRPr>
+          </a:p>
+          <a:p>
+            <a:pPr marL="457200" lvl="0" indent="-317500" algn="l" rtl="0">
+              <a:spcBef>
+                <a:spcPts val="0"/>
+              </a:spcBef>
+              <a:spcAft>
+                <a:spcPts val="0"/>
+              </a:spcAft>
+              <a:buClr>
+                <a:srgbClr val="CC4A4A"/>
+              </a:buClr>
+              <a:buSzPts val="1400"/>
+              <a:buChar char="●"/>
+            </a:pPr>
+            <a:r>
+              <a:rPr lang="en-US" i="1" dirty="0" err="1">
+                <a:solidFill>
+                  <a:schemeClr val="tx1"/>
+                </a:solidFill>
+              </a:rPr>
+              <a:t>Dapat</a:t>
+            </a:r>
+            <a:r>
+              <a:rPr lang="en-US" i="1" dirty="0">
+                <a:solidFill>
+                  <a:schemeClr val="tx1"/>
+                </a:solidFill>
+              </a:rPr>
+              <a:t> </a:t>
+            </a:r>
+            <a:r>
+              <a:rPr lang="en-US" i="1" dirty="0" err="1">
+                <a:solidFill>
+                  <a:schemeClr val="tx1"/>
+                </a:solidFill>
+              </a:rPr>
+              <a:t>menambah</a:t>
+            </a:r>
+            <a:r>
+              <a:rPr lang="en-US" i="1" dirty="0">
+                <a:solidFill>
+                  <a:schemeClr val="tx1"/>
+                </a:solidFill>
+              </a:rPr>
+              <a:t>/</a:t>
+            </a:r>
+            <a:r>
+              <a:rPr lang="en-US" i="1" dirty="0" err="1">
+                <a:solidFill>
+                  <a:schemeClr val="tx1"/>
+                </a:solidFill>
+              </a:rPr>
+              <a:t>membaca</a:t>
+            </a:r>
+            <a:r>
+              <a:rPr lang="en-US" i="1" dirty="0">
+                <a:solidFill>
+                  <a:schemeClr val="tx1"/>
+                </a:solidFill>
+              </a:rPr>
+              <a:t>/</a:t>
+            </a:r>
+            <a:r>
+              <a:rPr lang="en-US" i="1" dirty="0" err="1">
+                <a:solidFill>
+                  <a:schemeClr val="tx1"/>
+                </a:solidFill>
+              </a:rPr>
+              <a:t>menghapus</a:t>
+            </a:r>
+            <a:r>
+              <a:rPr lang="en-US" i="1" dirty="0">
+                <a:solidFill>
+                  <a:schemeClr val="tx1"/>
+                </a:solidFill>
+              </a:rPr>
+              <a:t> </a:t>
+            </a:r>
+            <a:r>
+              <a:rPr lang="en-US" b="1" i="1" dirty="0">
+                <a:solidFill>
+                  <a:srgbClr val="AD3A50"/>
+                </a:solidFill>
+              </a:rPr>
+              <a:t>baris </a:t>
+            </a:r>
+            <a:r>
+              <a:rPr lang="en-US" b="1" i="1" dirty="0" err="1">
+                <a:solidFill>
+                  <a:srgbClr val="AD3A50"/>
+                </a:solidFill>
+              </a:rPr>
+              <a:t>baru</a:t>
+            </a:r>
+            <a:endParaRPr lang="en-US" b="1" i="1" dirty="0">
+              <a:solidFill>
+                <a:srgbClr val="AD3A50"/>
+              </a:solidFill>
+            </a:endParaRPr>
+          </a:p>
+          <a:p>
+            <a:pPr marL="457200" lvl="0" indent="-317500" algn="l" rtl="0">
+              <a:spcBef>
+                <a:spcPts val="0"/>
+              </a:spcBef>
+              <a:spcAft>
+                <a:spcPts val="0"/>
+              </a:spcAft>
+              <a:buClr>
+                <a:srgbClr val="CC4A4A"/>
+              </a:buClr>
+              <a:buSzPts val="1400"/>
+              <a:buChar char="●"/>
+            </a:pPr>
+            <a:r>
+              <a:rPr lang="en-US" i="1" dirty="0" err="1">
+                <a:solidFill>
+                  <a:schemeClr val="tx1"/>
+                </a:solidFill>
+              </a:rPr>
+              <a:t>Dapat</a:t>
+            </a:r>
+            <a:r>
+              <a:rPr lang="en-US" i="1" dirty="0">
+                <a:solidFill>
+                  <a:schemeClr val="tx1"/>
+                </a:solidFill>
+              </a:rPr>
+              <a:t> </a:t>
+            </a:r>
+            <a:r>
+              <a:rPr lang="en-US" i="1" dirty="0" err="1">
+                <a:solidFill>
+                  <a:schemeClr val="tx1"/>
+                </a:solidFill>
+              </a:rPr>
+              <a:t>memunculkan</a:t>
+            </a:r>
+            <a:r>
+              <a:rPr lang="en-US" i="1" dirty="0">
+                <a:solidFill>
+                  <a:schemeClr val="tx1"/>
+                </a:solidFill>
+              </a:rPr>
+              <a:t> </a:t>
+            </a:r>
+            <a:r>
+              <a:rPr lang="en-US" b="1" i="1" dirty="0">
+                <a:solidFill>
+                  <a:srgbClr val="AD3A50"/>
+                </a:solidFill>
+              </a:rPr>
+              <a:t>scroll bar</a:t>
+            </a:r>
           </a:p>
           <a:p>
             <a:pPr marL="457200" lvl="0" indent="-317500" algn="l" rtl="0">
@@ -7912,7 +8106,7 @@
         </p:nvSpPr>
         <p:spPr>
           <a:xfrm>
-            <a:off x="1350000" y="622797"/>
+            <a:off x="1357952" y="158099"/>
             <a:ext cx="7047300" cy="653930"/>
           </a:xfrm>
           <a:prstGeom prst="rect">
@@ -8055,10 +8249,16 @@
           <a:prstGeom prst="rect">
             <a:avLst/>
           </a:prstGeom>
-          <a:noFill/>
           <a:ln>
             <a:noFill/>
           </a:ln>
+          <a:effectLst>
+            <a:outerShdw blurRad="292100" dist="139700" dir="2700000" algn="tl" rotWithShape="0">
+              <a:srgbClr val="333333">
+                <a:alpha val="65000"/>
+              </a:srgbClr>
+            </a:outerShdw>
+          </a:effectLst>
         </p:spPr>
       </p:pic>
     </p:spTree>

</xml_diff>